<commit_message>
Add new slide for drivers
</commit_message>
<xml_diff>
--- a/Project/Context/SistemaSeparacionAudio.context.pptx
+++ b/Project/Context/SistemaSeparacionAudio.context.pptx
@@ -12,21 +12,22 @@
     <p:sldId id="260" r:id="rId10"/>
     <p:sldId id="261" r:id="rId11"/>
     <p:sldId id="262" r:id="rId12"/>
+    <p:sldId id="263" r:id="rId13"/>
   </p:sldIdLst>
   <p:sldSz cx="18288000" cy="10287000"/>
   <p:notesSz cx="6858000" cy="9144000"/>
   <p:embeddedFontLst>
     <p:embeddedFont>
       <p:font typeface="Open Sans Bold" charset="1" panose="020B0806030504020204"/>
-      <p:regular r:id="rId13"/>
+      <p:regular r:id="rId14"/>
     </p:embeddedFont>
     <p:embeddedFont>
       <p:font typeface="Open Sans" charset="1" panose="020B0606030504020204"/>
-      <p:regular r:id="rId14"/>
+      <p:regular r:id="rId15"/>
     </p:embeddedFont>
     <p:embeddedFont>
       <p:font typeface="Open Sans Bold Italics" charset="1" panose="020B0806030504020204"/>
-      <p:regular r:id="rId15"/>
+      <p:regular r:id="rId16"/>
     </p:embeddedFont>
   </p:embeddedFontLst>
   <p:defaultTextStyle>
@@ -3236,7 +3237,7 @@
         <p:spPr>
           <a:xfrm rot="0">
             <a:off x="4424429" y="3619817"/>
-            <a:ext cx="9439141" cy="2980690"/>
+            <a:ext cx="9439141" cy="3580765"/>
           </a:xfrm>
           <a:prstGeom prst="rect">
             <a:avLst/>
@@ -3325,6 +3326,26 @@
                 <a:sym typeface="Open Sans"/>
               </a:rPr>
               <a:t>Atributos de Calidad</a:t>
+            </a:r>
+          </a:p>
+          <a:p>
+            <a:pPr algn="ctr" marL="734059" indent="-367030" lvl="1">
+              <a:lnSpc>
+                <a:spcPts val="4759"/>
+              </a:lnSpc>
+              <a:buAutoNum type="arabicPeriod" startAt="1"/>
+            </a:pPr>
+            <a:r>
+              <a:rPr lang="en-US" sz="3399">
+                <a:solidFill>
+                  <a:srgbClr val="000000"/>
+                </a:solidFill>
+                <a:latin typeface="Open Sans"/>
+                <a:ea typeface="Open Sans"/>
+                <a:cs typeface="Open Sans"/>
+                <a:sym typeface="Open Sans"/>
+              </a:rPr>
+              <a:t>Ponderación</a:t>
             </a:r>
           </a:p>
           <a:p>
@@ -4231,8 +4252,8 @@
         </p:nvSpPr>
         <p:spPr>
           <a:xfrm flipH="false" flipV="false" rot="0">
-            <a:off x="1581698" y="2333144"/>
-            <a:ext cx="15124604" cy="2230879"/>
+            <a:off x="790849" y="3911410"/>
+            <a:ext cx="16706302" cy="2464180"/>
           </a:xfrm>
           <a:custGeom>
             <a:avLst/>
@@ -4241,18 +4262,18 @@
             <a:cxnLst/>
             <a:rect r="r" b="b" t="t" l="l"/>
             <a:pathLst>
-              <a:path h="2230879" w="15124604">
+              <a:path h="2464180" w="16706302">
                 <a:moveTo>
                   <a:pt x="0" y="0"/>
                 </a:moveTo>
                 <a:lnTo>
-                  <a:pt x="15124604" y="0"/>
+                  <a:pt x="16706302" y="0"/>
                 </a:lnTo>
                 <a:lnTo>
-                  <a:pt x="15124604" y="2230879"/>
+                  <a:pt x="16706302" y="2464180"/>
                 </a:lnTo>
                 <a:lnTo>
-                  <a:pt x="0" y="2230879"/>
+                  <a:pt x="0" y="2464180"/>
                 </a:lnTo>
                 <a:lnTo>
                   <a:pt x="0" y="0"/>
@@ -4271,13 +4292,120 @@
       </p:sp>
       <p:sp>
         <p:nvSpPr>
+          <p:cNvPr name="TextBox 3" id="3"/>
+          <p:cNvSpPr txBox="true"/>
+          <p:nvPr/>
+        </p:nvSpPr>
+        <p:spPr>
+          <a:xfrm rot="0">
+            <a:off x="7069872" y="537527"/>
+            <a:ext cx="4148257" cy="887095"/>
+          </a:xfrm>
+          <a:prstGeom prst="rect">
+            <a:avLst/>
+          </a:prstGeom>
+        </p:spPr>
+        <p:txBody>
+          <a:bodyPr anchor="t" rtlCol="false" tIns="0" lIns="0" bIns="0" rIns="0">
+            <a:spAutoFit/>
+          </a:bodyPr>
+          <a:lstStyle/>
+          <a:p>
+            <a:pPr algn="ctr">
+              <a:lnSpc>
+                <a:spcPts val="7279"/>
+              </a:lnSpc>
+            </a:pPr>
+            <a:r>
+              <a:rPr lang="en-US" sz="5199" b="true">
+                <a:solidFill>
+                  <a:srgbClr val="000000"/>
+                </a:solidFill>
+                <a:latin typeface="Open Sans Bold"/>
+                <a:ea typeface="Open Sans Bold"/>
+                <a:cs typeface="Open Sans Bold"/>
+                <a:sym typeface="Open Sans Bold"/>
+              </a:rPr>
+              <a:t>Ponderación</a:t>
+            </a:r>
+          </a:p>
+        </p:txBody>
+      </p:sp>
+    </p:spTree>
+  </p:cSld>
+  <p:clrMapOvr>
+    <a:masterClrMapping/>
+  </p:clrMapOvr>
+</p:sld>
+</file>
+
+<file path=ppt/slides/slide8.xml><?xml version="1.0" encoding="utf-8"?>
+<p:sld xmlns:p="http://schemas.openxmlformats.org/presentationml/2006/main" xmlns:a="http://schemas.openxmlformats.org/drawingml/2006/main" xmlns:r="http://schemas.openxmlformats.org/officeDocument/2006/relationships">
+  <p:cSld>
+    <p:spTree>
+      <p:nvGrpSpPr>
+        <p:cNvPr id="1" name=""/>
+        <p:cNvGrpSpPr/>
+        <p:nvPr/>
+      </p:nvGrpSpPr>
+      <p:grpSpPr>
+        <a:xfrm>
+          <a:off x="0" y="0"/>
+          <a:ext cx="0" cy="0"/>
+          <a:chOff x="0" y="0"/>
+          <a:chExt cx="0" cy="0"/>
+        </a:xfrm>
+      </p:grpSpPr>
+      <p:sp>
+        <p:nvSpPr>
+          <p:cNvPr name="TextBox 2" id="2"/>
+          <p:cNvSpPr txBox="true"/>
+          <p:nvPr/>
+        </p:nvSpPr>
+        <p:spPr>
+          <a:xfrm rot="0">
+            <a:off x="5249763" y="537527"/>
+            <a:ext cx="7788473" cy="887095"/>
+          </a:xfrm>
+          <a:prstGeom prst="rect">
+            <a:avLst/>
+          </a:prstGeom>
+        </p:spPr>
+        <p:txBody>
+          <a:bodyPr anchor="t" rtlCol="false" tIns="0" lIns="0" bIns="0" rIns="0">
+            <a:spAutoFit/>
+          </a:bodyPr>
+          <a:lstStyle/>
+          <a:p>
+            <a:pPr algn="ctr">
+              <a:lnSpc>
+                <a:spcPts val="7279"/>
+              </a:lnSpc>
+            </a:pPr>
+            <a:r>
+              <a:rPr lang="en-US" sz="5199" b="true">
+                <a:solidFill>
+                  <a:srgbClr val="000000"/>
+                </a:solidFill>
+                <a:latin typeface="Open Sans Bold"/>
+                <a:ea typeface="Open Sans Bold"/>
+                <a:cs typeface="Open Sans Bold"/>
+                <a:sym typeface="Open Sans Bold"/>
+              </a:rPr>
+              <a:t>Drivers Arquitectónicos</a:t>
+            </a:r>
+          </a:p>
+        </p:txBody>
+      </p:sp>
+      <p:sp>
+        <p:nvSpPr>
           <p:cNvPr name="Freeform 3" id="3"/>
           <p:cNvSpPr/>
           <p:nvPr/>
         </p:nvSpPr>
         <p:spPr>
           <a:xfrm flipH="false" flipV="false" rot="0">
-            <a:off x="4342401" y="5468898"/>
+            <a:off x="4342401" y="3654736"/>
             <a:ext cx="9603198" cy="2977528"/>
           </a:xfrm>
           <a:custGeom>
@@ -4308,53 +4436,12 @@
             </a:pathLst>
           </a:custGeom>
           <a:blipFill>
-            <a:blip r:embed="rId3"/>
+            <a:blip r:embed="rId2"/>
             <a:stretch>
               <a:fillRect l="0" t="0" r="0" b="0"/>
             </a:stretch>
           </a:blipFill>
         </p:spPr>
-      </p:sp>
-      <p:sp>
-        <p:nvSpPr>
-          <p:cNvPr name="TextBox 4" id="4"/>
-          <p:cNvSpPr txBox="true"/>
-          <p:nvPr/>
-        </p:nvSpPr>
-        <p:spPr>
-          <a:xfrm rot="0">
-            <a:off x="5249763" y="537527"/>
-            <a:ext cx="7788473" cy="887095"/>
-          </a:xfrm>
-          <a:prstGeom prst="rect">
-            <a:avLst/>
-          </a:prstGeom>
-        </p:spPr>
-        <p:txBody>
-          <a:bodyPr anchor="t" rtlCol="false" tIns="0" lIns="0" bIns="0" rIns="0">
-            <a:spAutoFit/>
-          </a:bodyPr>
-          <a:lstStyle/>
-          <a:p>
-            <a:pPr algn="ctr">
-              <a:lnSpc>
-                <a:spcPts val="7279"/>
-              </a:lnSpc>
-            </a:pPr>
-            <a:r>
-              <a:rPr lang="en-US" sz="5199" b="true">
-                <a:solidFill>
-                  <a:srgbClr val="000000"/>
-                </a:solidFill>
-                <a:latin typeface="Open Sans Bold"/>
-                <a:ea typeface="Open Sans Bold"/>
-                <a:cs typeface="Open Sans Bold"/>
-                <a:sym typeface="Open Sans Bold"/>
-              </a:rPr>
-              <a:t>Drivers Arquitectónicos</a:t>
-            </a:r>
-          </a:p>
-        </p:txBody>
       </p:sp>
     </p:spTree>
   </p:cSld>

</xml_diff>